<commit_message>
Updated Experiment For Online
Updated instructions
Updated URL link
</commit_message>
<xml_diff>
--- a/Assets/StreamingAssets/2D_Objects/Circle/Circle.pptx
+++ b/Assets/StreamingAssets/2D_Objects/Circle/Circle.pptx
@@ -13,7 +13,7 @@
     <p:sldId id="273" r:id="rId7"/>
     <p:sldId id="291" r:id="rId8"/>
     <p:sldId id="263" r:id="rId9"/>
-    <p:sldId id="293" r:id="rId10"/>
+    <p:sldId id="264" r:id="rId10"/>
     <p:sldId id="265" r:id="rId11"/>
     <p:sldId id="294" r:id="rId12"/>
     <p:sldId id="268" r:id="rId13"/>
@@ -288,7 +288,7 @@
           <a:p>
             <a:fld id="{CA365A23-D275-4D5C-A163-A5AA11A9E6CE}" type="datetimeFigureOut">
               <a:rPr lang="en-US" smtClean="0"/>
-              <a:t>3/26/2020</a:t>
+              <a:t>5/8/2020</a:t>
             </a:fld>
             <a:endParaRPr lang="en-US"/>
           </a:p>
@@ -486,7 +486,7 @@
           <a:p>
             <a:fld id="{CA365A23-D275-4D5C-A163-A5AA11A9E6CE}" type="datetimeFigureOut">
               <a:rPr lang="en-US" smtClean="0"/>
-              <a:t>3/26/2020</a:t>
+              <a:t>5/8/2020</a:t>
             </a:fld>
             <a:endParaRPr lang="en-US"/>
           </a:p>
@@ -694,7 +694,7 @@
           <a:p>
             <a:fld id="{CA365A23-D275-4D5C-A163-A5AA11A9E6CE}" type="datetimeFigureOut">
               <a:rPr lang="en-US" smtClean="0"/>
-              <a:t>3/26/2020</a:t>
+              <a:t>5/8/2020</a:t>
             </a:fld>
             <a:endParaRPr lang="en-US"/>
           </a:p>
@@ -892,7 +892,7 @@
           <a:p>
             <a:fld id="{CA365A23-D275-4D5C-A163-A5AA11A9E6CE}" type="datetimeFigureOut">
               <a:rPr lang="en-US" smtClean="0"/>
-              <a:t>3/26/2020</a:t>
+              <a:t>5/8/2020</a:t>
             </a:fld>
             <a:endParaRPr lang="en-US"/>
           </a:p>
@@ -1167,7 +1167,7 @@
           <a:p>
             <a:fld id="{CA365A23-D275-4D5C-A163-A5AA11A9E6CE}" type="datetimeFigureOut">
               <a:rPr lang="en-US" smtClean="0"/>
-              <a:t>3/26/2020</a:t>
+              <a:t>5/8/2020</a:t>
             </a:fld>
             <a:endParaRPr lang="en-US"/>
           </a:p>
@@ -1432,7 +1432,7 @@
           <a:p>
             <a:fld id="{CA365A23-D275-4D5C-A163-A5AA11A9E6CE}" type="datetimeFigureOut">
               <a:rPr lang="en-US" smtClean="0"/>
-              <a:t>3/26/2020</a:t>
+              <a:t>5/8/2020</a:t>
             </a:fld>
             <a:endParaRPr lang="en-US"/>
           </a:p>
@@ -1844,7 +1844,7 @@
           <a:p>
             <a:fld id="{CA365A23-D275-4D5C-A163-A5AA11A9E6CE}" type="datetimeFigureOut">
               <a:rPr lang="en-US" smtClean="0"/>
-              <a:t>3/26/2020</a:t>
+              <a:t>5/8/2020</a:t>
             </a:fld>
             <a:endParaRPr lang="en-US"/>
           </a:p>
@@ -1985,7 +1985,7 @@
           <a:p>
             <a:fld id="{CA365A23-D275-4D5C-A163-A5AA11A9E6CE}" type="datetimeFigureOut">
               <a:rPr lang="en-US" smtClean="0"/>
-              <a:t>3/26/2020</a:t>
+              <a:t>5/8/2020</a:t>
             </a:fld>
             <a:endParaRPr lang="en-US"/>
           </a:p>
@@ -2098,7 +2098,7 @@
           <a:p>
             <a:fld id="{CA365A23-D275-4D5C-A163-A5AA11A9E6CE}" type="datetimeFigureOut">
               <a:rPr lang="en-US" smtClean="0"/>
-              <a:t>3/26/2020</a:t>
+              <a:t>5/8/2020</a:t>
             </a:fld>
             <a:endParaRPr lang="en-US"/>
           </a:p>
@@ -2409,7 +2409,7 @@
           <a:p>
             <a:fld id="{CA365A23-D275-4D5C-A163-A5AA11A9E6CE}" type="datetimeFigureOut">
               <a:rPr lang="en-US" smtClean="0"/>
-              <a:t>3/26/2020</a:t>
+              <a:t>5/8/2020</a:t>
             </a:fld>
             <a:endParaRPr lang="en-US"/>
           </a:p>
@@ -2697,7 +2697,7 @@
           <a:p>
             <a:fld id="{CA365A23-D275-4D5C-A163-A5AA11A9E6CE}" type="datetimeFigureOut">
               <a:rPr lang="en-US" smtClean="0"/>
-              <a:t>3/26/2020</a:t>
+              <a:t>5/8/2020</a:t>
             </a:fld>
             <a:endParaRPr lang="en-US"/>
           </a:p>
@@ -2938,7 +2938,7 @@
           <a:p>
             <a:fld id="{CA365A23-D275-4D5C-A163-A5AA11A9E6CE}" type="datetimeFigureOut">
               <a:rPr lang="en-US" smtClean="0"/>
-              <a:t>3/26/2020</a:t>
+              <a:t>5/8/2020</a:t>
             </a:fld>
             <a:endParaRPr lang="en-US"/>
           </a:p>
@@ -3585,7 +3585,7 @@
             </a:r>
             <a:r>
               <a:rPr lang="en-US" sz="2400" dirty="0"/>
-              <a:t>. On each round, you will be placed into the environment at a random location. </a:t>
+              <a:t>. </a:t>
             </a:r>
           </a:p>
           <a:p>
@@ -3594,7 +3594,7 @@
             </a:pPr>
             <a:r>
               <a:rPr lang="en-US" sz="2400" dirty="0"/>
-              <a:t>Once you’re in the environment you will have </a:t>
+              <a:t>On each round, you will be placed into the environment at a random location and will have </a:t>
             </a:r>
             <a:r>
               <a:rPr lang="en-US" sz="2400" b="1" dirty="0"/>
@@ -4050,7 +4050,7 @@
         <p:spPr>
           <a:xfrm>
             <a:off x="102036" y="234105"/>
-            <a:ext cx="12012783" cy="4351338"/>
+            <a:ext cx="12012783" cy="1981626"/>
           </a:xfrm>
         </p:spPr>
         <p:txBody>
@@ -4146,29 +4146,6 @@
               <a:rPr lang="en-US" sz="2400" dirty="0"/>
               <a:t> be able to see how much you’ve collected! </a:t>
             </a:r>
-          </a:p>
-          <a:p>
-            <a:pPr marL="0" indent="0" algn="ctr">
-              <a:buNone/>
-            </a:pPr>
-            <a:r>
-              <a:rPr lang="en-US" sz="2400" dirty="0"/>
-              <a:t>You will find out how much you collected on these rounds at the very end of the experiment!</a:t>
-            </a:r>
-            <a:r>
-              <a:rPr lang="en-US" sz="2400" b="1" dirty="0">
-                <a:solidFill>
-                  <a:srgbClr val="FF0000"/>
-                </a:solidFill>
-              </a:rPr>
-              <a:t> </a:t>
-            </a:r>
-          </a:p>
-          <a:p>
-            <a:pPr marL="0" indent="0" algn="ctr">
-              <a:buNone/>
-            </a:pPr>
-            <a:endParaRPr lang="en-US" sz="2400" dirty="0"/>
           </a:p>
         </p:txBody>
       </p:sp>
@@ -4210,67 +4187,6 @@
           </a:p>
         </p:txBody>
       </p:sp>
-      <p:sp>
-        <p:nvSpPr>
-          <p:cNvPr id="11" name="TextBox 10">
-            <a:extLst>
-              <a:ext uri="{FF2B5EF4-FFF2-40B4-BE49-F238E27FC236}">
-                <a16:creationId xmlns:a16="http://schemas.microsoft.com/office/drawing/2014/main" id="{27B6B530-6AE5-432D-BA2D-D6B3AA9CCB6D}"/>
-              </a:ext>
-            </a:extLst>
-          </p:cNvPr>
-          <p:cNvSpPr txBox="1"/>
-          <p:nvPr/>
-        </p:nvSpPr>
-        <p:spPr>
-          <a:xfrm>
-            <a:off x="0" y="5263067"/>
-            <a:ext cx="12192000" cy="830997"/>
-          </a:xfrm>
-          <a:prstGeom prst="rect">
-            <a:avLst/>
-          </a:prstGeom>
-          <a:noFill/>
-        </p:spPr>
-        <p:txBody>
-          <a:bodyPr wrap="square" rtlCol="0">
-            <a:spAutoFit/>
-          </a:bodyPr>
-          <a:lstStyle/>
-          <a:p>
-            <a:pPr algn="ctr"/>
-            <a:r>
-              <a:rPr lang="en-US" sz="2400" b="1" dirty="0">
-                <a:solidFill>
-                  <a:srgbClr val="FF0000"/>
-                </a:solidFill>
-              </a:rPr>
-              <a:t>HINT:</a:t>
-            </a:r>
-            <a:r>
-              <a:rPr lang="en-US" sz="2400" b="1" i="1" dirty="0">
-                <a:solidFill>
-                  <a:srgbClr val="FF0000"/>
-                </a:solidFill>
-              </a:rPr>
-              <a:t> </a:t>
-            </a:r>
-            <a:r>
-              <a:rPr lang="en-US" sz="2400" b="1" dirty="0">
-                <a:solidFill>
-                  <a:srgbClr val="FF0000"/>
-                </a:solidFill>
-              </a:rPr>
-              <a:t>On these rounds, use what you’ve learned from previous rounds to guide your search!</a:t>
-            </a:r>
-            <a:endParaRPr lang="en-US" sz="2400" dirty="0"/>
-          </a:p>
-          <a:p>
-            <a:pPr algn="ctr"/>
-            <a:endParaRPr lang="en-US" sz="2400" dirty="0"/>
-          </a:p>
-        </p:txBody>
-      </p:sp>
       <p:grpSp>
         <p:nvGrpSpPr>
           <p:cNvPr id="13" name="Group 12">
@@ -4285,7 +4201,7 @@
         </p:nvGrpSpPr>
         <p:grpSpPr>
           <a:xfrm>
-            <a:off x="1905371" y="2862649"/>
+            <a:off x="1905371" y="2368711"/>
             <a:ext cx="4924688" cy="1974142"/>
             <a:chOff x="1774659" y="4357276"/>
             <a:chExt cx="4924688" cy="1974142"/>
@@ -4402,7 +4318,7 @@
         </p:blipFill>
         <p:spPr>
           <a:xfrm>
-            <a:off x="6958633" y="2858904"/>
+            <a:off x="6958633" y="2364966"/>
             <a:ext cx="3525253" cy="1981629"/>
           </a:xfrm>
           <a:prstGeom prst="rect">
@@ -4424,6 +4340,82 @@
           </a:effectLst>
         </p:spPr>
       </p:pic>
+      <p:sp>
+        <p:nvSpPr>
+          <p:cNvPr id="9" name="TextBox 8">
+            <a:extLst>
+              <a:ext uri="{FF2B5EF4-FFF2-40B4-BE49-F238E27FC236}">
+                <a16:creationId xmlns:a16="http://schemas.microsoft.com/office/drawing/2014/main" id="{D32265B4-0885-4DEC-8325-938C5CC7FDB1}"/>
+              </a:ext>
+            </a:extLst>
+          </p:cNvPr>
+          <p:cNvSpPr txBox="1"/>
+          <p:nvPr/>
+        </p:nvSpPr>
+        <p:spPr>
+          <a:xfrm>
+            <a:off x="723990" y="4587915"/>
+            <a:ext cx="10744019" cy="1938992"/>
+          </a:xfrm>
+          <a:prstGeom prst="rect">
+            <a:avLst/>
+          </a:prstGeom>
+          <a:noFill/>
+        </p:spPr>
+        <p:txBody>
+          <a:bodyPr wrap="square" rtlCol="0">
+            <a:spAutoFit/>
+          </a:bodyPr>
+          <a:lstStyle/>
+          <a:p>
+            <a:pPr algn="ctr"/>
+            <a:r>
+              <a:rPr lang="en-US" sz="2400" dirty="0"/>
+              <a:t>You will still be collecting money, but you won’t know how much you collected on these rounds until the end of the Experiment!</a:t>
+            </a:r>
+          </a:p>
+          <a:p>
+            <a:pPr algn="ctr"/>
+            <a:endParaRPr lang="en-US" sz="2400" b="1" dirty="0">
+              <a:solidFill>
+                <a:srgbClr val="FF0000"/>
+              </a:solidFill>
+            </a:endParaRPr>
+          </a:p>
+          <a:p>
+            <a:pPr algn="ctr"/>
+            <a:r>
+              <a:rPr lang="en-US" sz="2400" b="1" dirty="0">
+                <a:solidFill>
+                  <a:srgbClr val="FF0000"/>
+                </a:solidFill>
+              </a:rPr>
+              <a:t>HINT:</a:t>
+            </a:r>
+            <a:r>
+              <a:rPr lang="en-US" sz="2400" b="1" i="1" dirty="0">
+                <a:solidFill>
+                  <a:srgbClr val="FF0000"/>
+                </a:solidFill>
+              </a:rPr>
+              <a:t> </a:t>
+            </a:r>
+            <a:r>
+              <a:rPr lang="en-US" sz="2400" dirty="0">
+                <a:solidFill>
+                  <a:srgbClr val="FF0000"/>
+                </a:solidFill>
+              </a:rPr>
+              <a:t>Use what you’ve learned from the Feedback Rounds to guide your search!</a:t>
+            </a:r>
+            <a:endParaRPr lang="en-US" sz="2400" dirty="0"/>
+          </a:p>
+          <a:p>
+            <a:pPr algn="ctr"/>
+            <a:endParaRPr lang="en-US" sz="2400" dirty="0"/>
+          </a:p>
+        </p:txBody>
+      </p:sp>
     </p:spTree>
     <p:extLst>
       <p:ext uri="{BB962C8B-B14F-4D97-AF65-F5344CB8AC3E}">
@@ -4472,13 +4464,13 @@
         </p:nvSpPr>
         <p:spPr>
           <a:xfrm>
-            <a:off x="567159" y="357126"/>
-            <a:ext cx="11076973" cy="2155812"/>
+            <a:off x="607980" y="344879"/>
+            <a:ext cx="11076973" cy="557275"/>
           </a:xfrm>
         </p:spPr>
         <p:txBody>
           <a:bodyPr>
-            <a:normAutofit/>
+            <a:normAutofit lnSpcReduction="10000"/>
           </a:bodyPr>
           <a:lstStyle/>
           <a:p>
@@ -4487,52 +4479,7 @@
             </a:pPr>
             <a:r>
               <a:rPr lang="en-US" sz="3600" b="1" dirty="0"/>
-              <a:t>BONUS PAYMENT</a:t>
-            </a:r>
-          </a:p>
-          <a:p>
-            <a:pPr marL="0" indent="0" algn="ctr">
-              <a:buNone/>
-            </a:pPr>
-            <a:r>
-              <a:rPr lang="en-US" sz="2400" dirty="0"/>
-              <a:t>There is an </a:t>
-            </a:r>
-            <a:r>
-              <a:rPr lang="en-US" sz="2400" b="1" dirty="0">
-                <a:solidFill>
-                  <a:srgbClr val="FF0000"/>
-                </a:solidFill>
-              </a:rPr>
-              <a:t>UNLIMITED</a:t>
-            </a:r>
-            <a:r>
-              <a:rPr lang="en-US" sz="2400" dirty="0"/>
-              <a:t> amount of money to collect in each round</a:t>
-            </a:r>
-            <a:r>
-              <a:rPr lang="en-US" altLang="zh-CN" sz="2400" dirty="0"/>
-              <a:t>.</a:t>
-            </a:r>
-            <a:r>
-              <a:rPr lang="zh-CN" altLang="en-US" sz="2400" dirty="0"/>
-              <a:t> </a:t>
-            </a:r>
-            <a:r>
-              <a:rPr lang="en-US" altLang="zh-CN" sz="2400" dirty="0"/>
-              <a:t>The money you collect in each round will be counted towards your </a:t>
-            </a:r>
-            <a:r>
-              <a:rPr lang="en-US" sz="2400" b="1" dirty="0">
-                <a:solidFill>
-                  <a:schemeClr val="accent6"/>
-                </a:solidFill>
-              </a:rPr>
-              <a:t>BONUS PAYMENT!</a:t>
-            </a:r>
-            <a:r>
-              <a:rPr lang="en-US" sz="2400" dirty="0"/>
-              <a:t> The more you collect the more bonus you will receive!!! </a:t>
+              <a:t>BONUS ROUNDS</a:t>
             </a:r>
           </a:p>
           <a:p>
@@ -4571,8 +4518,8 @@
         </p:blipFill>
         <p:spPr>
           <a:xfrm>
-            <a:off x="4312453" y="2122173"/>
-            <a:ext cx="3580110" cy="3712148"/>
+            <a:off x="4829105" y="2551339"/>
+            <a:ext cx="2634721" cy="2731892"/>
           </a:xfrm>
           <a:prstGeom prst="rect">
             <a:avLst/>
@@ -4587,7 +4534,7 @@
         </p:nvSpPr>
         <p:spPr>
           <a:xfrm>
-            <a:off x="3641723" y="5973619"/>
+            <a:off x="3641723" y="6169562"/>
             <a:ext cx="4782193" cy="461665"/>
           </a:xfrm>
           <a:prstGeom prst="rect">
@@ -4613,6 +4560,154 @@
             <a:r>
               <a:rPr lang="en-US" sz="2400" b="1" dirty="0"/>
               <a:t> </a:t>
+            </a:r>
+          </a:p>
+        </p:txBody>
+      </p:sp>
+      <p:sp>
+        <p:nvSpPr>
+          <p:cNvPr id="2" name="Rectangle 1">
+            <a:extLst>
+              <a:ext uri="{FF2B5EF4-FFF2-40B4-BE49-F238E27FC236}">
+                <a16:creationId xmlns:a16="http://schemas.microsoft.com/office/drawing/2014/main" id="{1B23D7BD-4A3F-4287-A02B-D922CC490461}"/>
+              </a:ext>
+            </a:extLst>
+          </p:cNvPr>
+          <p:cNvSpPr/>
+          <p:nvPr/>
+        </p:nvSpPr>
+        <p:spPr>
+          <a:xfrm>
+            <a:off x="171451" y="825342"/>
+            <a:ext cx="11828808" cy="2246769"/>
+          </a:xfrm>
+          <a:prstGeom prst="rect">
+            <a:avLst/>
+          </a:prstGeom>
+        </p:spPr>
+        <p:txBody>
+          <a:bodyPr wrap="square">
+            <a:spAutoFit/>
+          </a:bodyPr>
+          <a:lstStyle/>
+          <a:p>
+            <a:pPr algn="ctr"/>
+            <a:r>
+              <a:rPr lang="en-US" sz="2800" dirty="0"/>
+              <a:t>You will now complete several </a:t>
+            </a:r>
+            <a:r>
+              <a:rPr lang="en-US" sz="2800" b="1" dirty="0"/>
+              <a:t>Feedback </a:t>
+            </a:r>
+            <a:r>
+              <a:rPr lang="en-US" sz="2800" dirty="0"/>
+              <a:t>and </a:t>
+            </a:r>
+            <a:r>
+              <a:rPr lang="en-US" sz="2800" b="1" dirty="0"/>
+              <a:t>No Feedback </a:t>
+            </a:r>
+            <a:r>
+              <a:rPr lang="en-US" sz="2800" dirty="0"/>
+              <a:t>rounds </a:t>
+            </a:r>
+            <a:r>
+              <a:rPr lang="en-US" sz="2800" b="1" dirty="0"/>
+              <a:t>on your own</a:t>
+            </a:r>
+            <a:r>
+              <a:rPr lang="en-US" sz="2800" dirty="0"/>
+              <a:t>.</a:t>
+            </a:r>
+          </a:p>
+          <a:p>
+            <a:pPr algn="ctr"/>
+            <a:r>
+              <a:rPr lang="en-US" sz="2800" b="1" dirty="0"/>
+              <a:t>Remember: </a:t>
+            </a:r>
+            <a:r>
+              <a:rPr lang="en-US" sz="2800" dirty="0"/>
+              <a:t>There is an </a:t>
+            </a:r>
+            <a:r>
+              <a:rPr lang="en-US" sz="2800" b="1" dirty="0">
+                <a:solidFill>
+                  <a:srgbClr val="FF0000"/>
+                </a:solidFill>
+              </a:rPr>
+              <a:t>UNLIMITED</a:t>
+            </a:r>
+            <a:r>
+              <a:rPr lang="en-US" sz="2800" dirty="0"/>
+              <a:t> amount of money to collect in each round</a:t>
+            </a:r>
+            <a:r>
+              <a:rPr lang="en-US" altLang="zh-CN" sz="2800" dirty="0"/>
+              <a:t>.</a:t>
+            </a:r>
+            <a:r>
+              <a:rPr lang="zh-CN" altLang="en-US" sz="2800" dirty="0"/>
+              <a:t> </a:t>
+            </a:r>
+            <a:r>
+              <a:rPr lang="en-US" altLang="zh-CN" sz="2800" dirty="0"/>
+              <a:t>The money you collect in each round will be counted towards your </a:t>
+            </a:r>
+            <a:r>
+              <a:rPr lang="en-US" sz="2800" b="1" dirty="0">
+                <a:solidFill>
+                  <a:schemeClr val="accent6"/>
+                </a:solidFill>
+              </a:rPr>
+              <a:t>BONUS PAYMENT!</a:t>
+            </a:r>
+            <a:r>
+              <a:rPr lang="en-US" sz="2800" dirty="0"/>
+              <a:t> </a:t>
+            </a:r>
+          </a:p>
+          <a:p>
+            <a:pPr algn="ctr"/>
+            <a:r>
+              <a:rPr lang="en-US" sz="2800" dirty="0"/>
+              <a:t> </a:t>
+            </a:r>
+          </a:p>
+        </p:txBody>
+      </p:sp>
+      <p:sp>
+        <p:nvSpPr>
+          <p:cNvPr id="6" name="Rectangle 5">
+            <a:extLst>
+              <a:ext uri="{FF2B5EF4-FFF2-40B4-BE49-F238E27FC236}">
+                <a16:creationId xmlns:a16="http://schemas.microsoft.com/office/drawing/2014/main" id="{86F7A433-26A0-45B7-874C-9A154F2DD25D}"/>
+              </a:ext>
+            </a:extLst>
+          </p:cNvPr>
+          <p:cNvSpPr/>
+          <p:nvPr/>
+        </p:nvSpPr>
+        <p:spPr>
+          <a:xfrm>
+            <a:off x="2870519" y="5509438"/>
+            <a:ext cx="6096000" cy="523220"/>
+          </a:xfrm>
+          <a:prstGeom prst="rect">
+            <a:avLst/>
+          </a:prstGeom>
+        </p:spPr>
+        <p:txBody>
+          <a:bodyPr>
+            <a:spAutoFit/>
+          </a:bodyPr>
+          <a:lstStyle/>
+          <a:p>
+            <a:pPr algn="ctr"/>
+            <a:r>
+              <a:rPr lang="en-US" sz="2800" dirty="0"/>
+              <a:t>Do you have any questions?</a:t>
             </a:r>
           </a:p>
         </p:txBody>
@@ -5562,7 +5657,7 @@
             <a:noFill/>
             <a:extLst>
               <a:ext uri="{909E8E84-426E-40dd-AFC4-6F175D3DCCD1}">
-                <a14:hiddenFill xmlns:a14="http://schemas.microsoft.com/office/drawing/2010/main" xmlns="">
+                <a14:hiddenFill xmlns="" xmlns:a14="http://schemas.microsoft.com/office/drawing/2010/main">
                   <a:solidFill>
                     <a:srgbClr val="FFFFFF"/>
                   </a:solidFill>
@@ -5607,7 +5702,7 @@
             <a:noFill/>
             <a:extLst>
               <a:ext uri="{909E8E84-426E-40dd-AFC4-6F175D3DCCD1}">
-                <a14:hiddenFill xmlns:a14="http://schemas.microsoft.com/office/drawing/2010/main" xmlns="">
+                <a14:hiddenFill xmlns="" xmlns:a14="http://schemas.microsoft.com/office/drawing/2010/main">
                   <a:solidFill>
                     <a:srgbClr val="FFFFFF"/>
                   </a:solidFill>
@@ -5652,7 +5747,7 @@
             <a:noFill/>
             <a:extLst>
               <a:ext uri="{909E8E84-426E-40dd-AFC4-6F175D3DCCD1}">
-                <a14:hiddenFill xmlns:a14="http://schemas.microsoft.com/office/drawing/2010/main" xmlns="">
+                <a14:hiddenFill xmlns="" xmlns:a14="http://schemas.microsoft.com/office/drawing/2010/main">
                   <a:solidFill>
                     <a:srgbClr val="FFFFFF"/>
                   </a:solidFill>
@@ -5710,7 +5805,7 @@
         </p:nvSpPr>
         <p:spPr>
           <a:xfrm>
-            <a:off x="838200" y="1022576"/>
+            <a:off x="838200" y="251051"/>
             <a:ext cx="10515600" cy="5353010"/>
           </a:xfrm>
         </p:spPr>
@@ -5743,6 +5838,46 @@
             <a:r>
               <a:rPr lang="en-US" sz="4400" dirty="0"/>
               <a:t>section!</a:t>
+            </a:r>
+          </a:p>
+          <a:p>
+            <a:pPr marL="0" indent="0" algn="ctr">
+              <a:buNone/>
+            </a:pPr>
+            <a:r>
+              <a:rPr lang="en-US" sz="4400" b="1" u="sng" dirty="0">
+                <a:solidFill>
+                  <a:srgbClr val="FF0000"/>
+                </a:solidFill>
+              </a:rPr>
+              <a:t>PLEASE NOTIFY THE EXPERIMENTER!!!</a:t>
+            </a:r>
+          </a:p>
+          <a:p>
+            <a:pPr marL="0" indent="0" algn="ctr">
+              <a:buNone/>
+            </a:pPr>
+            <a:endParaRPr lang="en-US" sz="4400" b="1" u="sng" dirty="0">
+              <a:solidFill>
+                <a:srgbClr val="FF0000"/>
+              </a:solidFill>
+            </a:endParaRPr>
+          </a:p>
+          <a:p>
+            <a:pPr marL="0" indent="0" algn="ctr">
+              <a:buNone/>
+            </a:pPr>
+            <a:r>
+              <a:rPr lang="en-US" sz="3000" dirty="0"/>
+              <a:t>Let’s move on to the </a:t>
+            </a:r>
+            <a:r>
+              <a:rPr lang="en-US" sz="3000" b="1" dirty="0"/>
+              <a:t>Find The Trophy </a:t>
+            </a:r>
+            <a:r>
+              <a:rPr lang="en-US" sz="3000" dirty="0"/>
+              <a:t>section</a:t>
             </a:r>
           </a:p>
           <a:p>
@@ -5791,32 +5926,6 @@
             </a:pPr>
             <a:endParaRPr lang="en-US" sz="500" b="1" dirty="0"/>
           </a:p>
-          <a:p>
-            <a:pPr marL="0" indent="0" algn="ctr">
-              <a:buNone/>
-            </a:pPr>
-            <a:r>
-              <a:rPr lang="en-US" dirty="0"/>
-              <a:t>Next, you’ll complete the </a:t>
-            </a:r>
-            <a:r>
-              <a:rPr lang="en-US" b="1" dirty="0"/>
-              <a:t>Find The Trophy </a:t>
-            </a:r>
-            <a:r>
-              <a:rPr lang="en-US" dirty="0"/>
-              <a:t>task! </a:t>
-            </a:r>
-            <a:r>
-              <a:rPr lang="en-US" sz="3200" dirty="0"/>
-              <a:t>F</a:t>
-            </a:r>
-            <a:r>
-              <a:rPr lang="en-US" dirty="0"/>
-              <a:t>eel free to take a quick break before moving on!</a:t>
-            </a:r>
-            <a:endParaRPr lang="en-US" sz="2400" dirty="0"/>
-          </a:p>
         </p:txBody>
       </p:sp>
       <p:sp>
@@ -5827,7 +5936,7 @@
         </p:nvSpPr>
         <p:spPr>
           <a:xfrm>
-            <a:off x="2026261" y="5711006"/>
+            <a:off x="1838483" y="6049824"/>
             <a:ext cx="8229518" cy="461665"/>
           </a:xfrm>
           <a:prstGeom prst="rect">
@@ -5844,7 +5953,7 @@
             <a:pPr algn="ctr"/>
             <a:r>
               <a:rPr lang="en-US" sz="2400" b="1" dirty="0"/>
-              <a:t>When you are ready, press Spacebar to continue </a:t>
+              <a:t>press Spacebar to continue </a:t>
             </a:r>
             <a:r>
               <a:rPr lang="mr-IN" sz="2400" b="1" dirty="0"/>
@@ -6782,7 +6891,7 @@
             <a:noFill/>
             <a:extLst>
               <a:ext uri="{909E8E84-426E-40dd-AFC4-6F175D3DCCD1}">
-                <a14:hiddenFill xmlns:a14="http://schemas.microsoft.com/office/drawing/2010/main" xmlns="">
+                <a14:hiddenFill xmlns="" xmlns:a14="http://schemas.microsoft.com/office/drawing/2010/main">
                   <a:solidFill>
                     <a:srgbClr val="FFFFFF"/>
                   </a:solidFill>
@@ -7490,7 +7599,7 @@
             <a:noFill/>
             <a:extLst>
               <a:ext uri="{909E8E84-426E-40dd-AFC4-6F175D3DCCD1}">
-                <a14:hiddenFill xmlns:a14="http://schemas.microsoft.com/office/drawing/2010/main" xmlns="">
+                <a14:hiddenFill xmlns="" xmlns:a14="http://schemas.microsoft.com/office/drawing/2010/main">
                   <a:solidFill>
                     <a:srgbClr val="FFFFFF"/>
                   </a:solidFill>
@@ -7535,7 +7644,7 @@
             <a:noFill/>
             <a:extLst>
               <a:ext uri="{909E8E84-426E-40dd-AFC4-6F175D3DCCD1}">
-                <a14:hiddenFill xmlns:a14="http://schemas.microsoft.com/office/drawing/2010/main" xmlns="">
+                <a14:hiddenFill xmlns="" xmlns:a14="http://schemas.microsoft.com/office/drawing/2010/main">
                   <a:solidFill>
                     <a:srgbClr val="FFFFFF"/>
                   </a:solidFill>
@@ -7580,7 +7689,7 @@
             <a:noFill/>
             <a:extLst>
               <a:ext uri="{909E8E84-426E-40dd-AFC4-6F175D3DCCD1}">
-                <a14:hiddenFill xmlns:a14="http://schemas.microsoft.com/office/drawing/2010/main" xmlns="">
+                <a14:hiddenFill xmlns="" xmlns:a14="http://schemas.microsoft.com/office/drawing/2010/main">
                   <a:solidFill>
                     <a:srgbClr val="FFFFFF"/>
                   </a:solidFill>
@@ -8222,22 +8331,14 @@
         </p:spPr>
         <p:txBody>
           <a:bodyPr>
-            <a:normAutofit fontScale="90000"/>
+            <a:normAutofit/>
           </a:bodyPr>
           <a:lstStyle/>
           <a:p>
             <a:pPr algn="ctr"/>
             <a:r>
               <a:rPr lang="en-US" dirty="0"/>
-              <a:t>Please make sure your headphones or speakers are </a:t>
-            </a:r>
-            <a:r>
-              <a:rPr lang="en-US" b="1" dirty="0"/>
-              <a:t>on</a:t>
-            </a:r>
-            <a:r>
-              <a:rPr lang="en-US" dirty="0"/>
-              <a:t>. You should hear a </a:t>
+              <a:t>You should hear a </a:t>
             </a:r>
             <a:r>
               <a:rPr lang="en-US" b="1" dirty="0"/>
@@ -8283,7 +8384,7 @@
         </p:blipFill>
         <p:spPr>
           <a:xfrm>
-            <a:off x="4432137" y="1369413"/>
+            <a:off x="4502818" y="1302530"/>
             <a:ext cx="3186363" cy="3186363"/>
           </a:xfrm>
         </p:spPr>
@@ -8302,7 +8403,7 @@
         </p:nvSpPr>
         <p:spPr>
           <a:xfrm>
-            <a:off x="511913" y="4239497"/>
+            <a:off x="556589" y="4223435"/>
             <a:ext cx="10902121" cy="1569660"/>
           </a:xfrm>
           <a:prstGeom prst="rect">
@@ -8318,7 +8419,7 @@
             <a:pPr algn="ctr"/>
             <a:r>
               <a:rPr lang="en-US" sz="3200" dirty="0"/>
-              <a:t>Let’s make sure everything is still working correctly! Keep moving around the environment until you collect </a:t>
+              <a:t>Let’s make sure everything is working correctly! Keep moving around the environment until you collect </a:t>
             </a:r>
             <a:r>
               <a:rPr lang="en-US" sz="3200" b="1" dirty="0">
@@ -8330,7 +8431,7 @@
             </a:r>
             <a:r>
               <a:rPr lang="en-US" sz="3200" dirty="0"/>
-              <a:t>worth of money! Adjust the volume as necessary!</a:t>
+              <a:t>worth of money! Feel free to adjust your volume as necessary!</a:t>
             </a:r>
           </a:p>
         </p:txBody>
@@ -8340,7 +8441,7 @@
           <p:cNvPr id="6" name="TextBox 5">
             <a:extLst>
               <a:ext uri="{FF2B5EF4-FFF2-40B4-BE49-F238E27FC236}">
-                <a16:creationId xmlns:a16="http://schemas.microsoft.com/office/drawing/2014/main" id="{A8CE85A5-BD11-4EFC-AF27-672A1270EA59}"/>
+                <a16:creationId xmlns:a16="http://schemas.microsoft.com/office/drawing/2014/main" id="{F5CB7FBE-DA42-44BB-BBEC-0A9E70175862}"/>
               </a:ext>
             </a:extLst>
           </p:cNvPr>
@@ -8349,7 +8450,7 @@
         </p:nvSpPr>
         <p:spPr>
           <a:xfrm>
-            <a:off x="3641723" y="5973619"/>
+            <a:off x="3886467" y="6182211"/>
             <a:ext cx="4782193" cy="461665"/>
           </a:xfrm>
           <a:prstGeom prst="rect">
@@ -8382,7 +8483,7 @@
     </p:spTree>
     <p:extLst>
       <p:ext uri="{BB962C8B-B14F-4D97-AF65-F5344CB8AC3E}">
-        <p14:creationId xmlns:p14="http://schemas.microsoft.com/office/powerpoint/2010/main" val="4061122178"/>
+        <p14:creationId xmlns:p14="http://schemas.microsoft.com/office/powerpoint/2010/main" val="3340275105"/>
       </p:ext>
     </p:extLst>
   </p:cSld>

</xml_diff>

<commit_message>
Updated Configuration files and instruction screens
Updated configuration files so that bleep trials don't occur in WaterMaze task

Updated instruction screens "Experiment Survey" instead of "Finish Survey"
</commit_message>
<xml_diff>
--- a/Assets/StreamingAssets/2D_Objects/Circle/Circle.pptx
+++ b/Assets/StreamingAssets/2D_Objects/Circle/Circle.pptx
@@ -288,7 +288,7 @@
           <a:p>
             <a:fld id="{CA365A23-D275-4D5C-A163-A5AA11A9E6CE}" type="datetimeFigureOut">
               <a:rPr lang="en-US" smtClean="0"/>
-              <a:t>5/8/2020</a:t>
+              <a:t>5/9/2020</a:t>
             </a:fld>
             <a:endParaRPr lang="en-US"/>
           </a:p>
@@ -486,7 +486,7 @@
           <a:p>
             <a:fld id="{CA365A23-D275-4D5C-A163-A5AA11A9E6CE}" type="datetimeFigureOut">
               <a:rPr lang="en-US" smtClean="0"/>
-              <a:t>5/8/2020</a:t>
+              <a:t>5/9/2020</a:t>
             </a:fld>
             <a:endParaRPr lang="en-US"/>
           </a:p>
@@ -694,7 +694,7 @@
           <a:p>
             <a:fld id="{CA365A23-D275-4D5C-A163-A5AA11A9E6CE}" type="datetimeFigureOut">
               <a:rPr lang="en-US" smtClean="0"/>
-              <a:t>5/8/2020</a:t>
+              <a:t>5/9/2020</a:t>
             </a:fld>
             <a:endParaRPr lang="en-US"/>
           </a:p>
@@ -892,7 +892,7 @@
           <a:p>
             <a:fld id="{CA365A23-D275-4D5C-A163-A5AA11A9E6CE}" type="datetimeFigureOut">
               <a:rPr lang="en-US" smtClean="0"/>
-              <a:t>5/8/2020</a:t>
+              <a:t>5/9/2020</a:t>
             </a:fld>
             <a:endParaRPr lang="en-US"/>
           </a:p>
@@ -1167,7 +1167,7 @@
           <a:p>
             <a:fld id="{CA365A23-D275-4D5C-A163-A5AA11A9E6CE}" type="datetimeFigureOut">
               <a:rPr lang="en-US" smtClean="0"/>
-              <a:t>5/8/2020</a:t>
+              <a:t>5/9/2020</a:t>
             </a:fld>
             <a:endParaRPr lang="en-US"/>
           </a:p>
@@ -1432,7 +1432,7 @@
           <a:p>
             <a:fld id="{CA365A23-D275-4D5C-A163-A5AA11A9E6CE}" type="datetimeFigureOut">
               <a:rPr lang="en-US" smtClean="0"/>
-              <a:t>5/8/2020</a:t>
+              <a:t>5/9/2020</a:t>
             </a:fld>
             <a:endParaRPr lang="en-US"/>
           </a:p>
@@ -1844,7 +1844,7 @@
           <a:p>
             <a:fld id="{CA365A23-D275-4D5C-A163-A5AA11A9E6CE}" type="datetimeFigureOut">
               <a:rPr lang="en-US" smtClean="0"/>
-              <a:t>5/8/2020</a:t>
+              <a:t>5/9/2020</a:t>
             </a:fld>
             <a:endParaRPr lang="en-US"/>
           </a:p>
@@ -1985,7 +1985,7 @@
           <a:p>
             <a:fld id="{CA365A23-D275-4D5C-A163-A5AA11A9E6CE}" type="datetimeFigureOut">
               <a:rPr lang="en-US" smtClean="0"/>
-              <a:t>5/8/2020</a:t>
+              <a:t>5/9/2020</a:t>
             </a:fld>
             <a:endParaRPr lang="en-US"/>
           </a:p>
@@ -2098,7 +2098,7 @@
           <a:p>
             <a:fld id="{CA365A23-D275-4D5C-A163-A5AA11A9E6CE}" type="datetimeFigureOut">
               <a:rPr lang="en-US" smtClean="0"/>
-              <a:t>5/8/2020</a:t>
+              <a:t>5/9/2020</a:t>
             </a:fld>
             <a:endParaRPr lang="en-US"/>
           </a:p>
@@ -2409,7 +2409,7 @@
           <a:p>
             <a:fld id="{CA365A23-D275-4D5C-A163-A5AA11A9E6CE}" type="datetimeFigureOut">
               <a:rPr lang="en-US" smtClean="0"/>
-              <a:t>5/8/2020</a:t>
+              <a:t>5/9/2020</a:t>
             </a:fld>
             <a:endParaRPr lang="en-US"/>
           </a:p>
@@ -2697,7 +2697,7 @@
           <a:p>
             <a:fld id="{CA365A23-D275-4D5C-A163-A5AA11A9E6CE}" type="datetimeFigureOut">
               <a:rPr lang="en-US" smtClean="0"/>
-              <a:t>5/8/2020</a:t>
+              <a:t>5/9/2020</a:t>
             </a:fld>
             <a:endParaRPr lang="en-US"/>
           </a:p>
@@ -2938,7 +2938,7 @@
           <a:p>
             <a:fld id="{CA365A23-D275-4D5C-A163-A5AA11A9E6CE}" type="datetimeFigureOut">
               <a:rPr lang="en-US" smtClean="0"/>
-              <a:t>5/8/2020</a:t>
+              <a:t>5/9/2020</a:t>
             </a:fld>
             <a:endParaRPr lang="en-US"/>
           </a:p>
@@ -5657,7 +5657,7 @@
             <a:noFill/>
             <a:extLst>
               <a:ext uri="{909E8E84-426E-40dd-AFC4-6F175D3DCCD1}">
-                <a14:hiddenFill xmlns="" xmlns:a14="http://schemas.microsoft.com/office/drawing/2010/main">
+                <a14:hiddenFill xmlns:a14="http://schemas.microsoft.com/office/drawing/2010/main" xmlns="">
                   <a:solidFill>
                     <a:srgbClr val="FFFFFF"/>
                   </a:solidFill>
@@ -5702,7 +5702,7 @@
             <a:noFill/>
             <a:extLst>
               <a:ext uri="{909E8E84-426E-40dd-AFC4-6F175D3DCCD1}">
-                <a14:hiddenFill xmlns="" xmlns:a14="http://schemas.microsoft.com/office/drawing/2010/main">
+                <a14:hiddenFill xmlns:a14="http://schemas.microsoft.com/office/drawing/2010/main" xmlns="">
                   <a:solidFill>
                     <a:srgbClr val="FFFFFF"/>
                   </a:solidFill>
@@ -5747,7 +5747,7 @@
             <a:noFill/>
             <a:extLst>
               <a:ext uri="{909E8E84-426E-40dd-AFC4-6F175D3DCCD1}">
-                <a14:hiddenFill xmlns="" xmlns:a14="http://schemas.microsoft.com/office/drawing/2010/main">
+                <a14:hiddenFill xmlns:a14="http://schemas.microsoft.com/office/drawing/2010/main" xmlns="">
                   <a:solidFill>
                     <a:srgbClr val="FFFFFF"/>
                   </a:solidFill>
@@ -5917,7 +5917,7 @@
             </a:pPr>
             <a:r>
               <a:rPr lang="en-US" sz="3000" dirty="0"/>
-              <a:t>Finish Survey</a:t>
+              <a:t>Experiment Survey</a:t>
             </a:r>
           </a:p>
           <a:p>
@@ -6891,7 +6891,7 @@
             <a:noFill/>
             <a:extLst>
               <a:ext uri="{909E8E84-426E-40dd-AFC4-6F175D3DCCD1}">
-                <a14:hiddenFill xmlns="" xmlns:a14="http://schemas.microsoft.com/office/drawing/2010/main">
+                <a14:hiddenFill xmlns:a14="http://schemas.microsoft.com/office/drawing/2010/main" xmlns="">
                   <a:solidFill>
                     <a:srgbClr val="FFFFFF"/>
                   </a:solidFill>
@@ -7599,7 +7599,7 @@
             <a:noFill/>
             <a:extLst>
               <a:ext uri="{909E8E84-426E-40dd-AFC4-6F175D3DCCD1}">
-                <a14:hiddenFill xmlns="" xmlns:a14="http://schemas.microsoft.com/office/drawing/2010/main">
+                <a14:hiddenFill xmlns:a14="http://schemas.microsoft.com/office/drawing/2010/main" xmlns="">
                   <a:solidFill>
                     <a:srgbClr val="FFFFFF"/>
                   </a:solidFill>
@@ -7644,7 +7644,7 @@
             <a:noFill/>
             <a:extLst>
               <a:ext uri="{909E8E84-426E-40dd-AFC4-6F175D3DCCD1}">
-                <a14:hiddenFill xmlns="" xmlns:a14="http://schemas.microsoft.com/office/drawing/2010/main">
+                <a14:hiddenFill xmlns:a14="http://schemas.microsoft.com/office/drawing/2010/main" xmlns="">
                   <a:solidFill>
                     <a:srgbClr val="FFFFFF"/>
                   </a:solidFill>
@@ -7689,7 +7689,7 @@
             <a:noFill/>
             <a:extLst>
               <a:ext uri="{909E8E84-426E-40dd-AFC4-6F175D3DCCD1}">
-                <a14:hiddenFill xmlns="" xmlns:a14="http://schemas.microsoft.com/office/drawing/2010/main">
+                <a14:hiddenFill xmlns:a14="http://schemas.microsoft.com/office/drawing/2010/main" xmlns="">
                   <a:solidFill>
                     <a:srgbClr val="FFFFFF"/>
                   </a:solidFill>

</xml_diff>